<commit_message>
Add Zach's degree program on intro slide
</commit_message>
<xml_diff>
--- a/The Store App.pptx
+++ b/The Store App.pptx
@@ -110,6 +110,11 @@
       </a:defRPr>
     </a:lvl9pPr>
   </p:defaultTextStyle>
+  <p:extLst>
+    <p:ext uri="{EFAFB233-063F-42B5-8137-9DF3F51BA10A}">
+      <p15:sldGuideLst xmlns:p15="http://schemas.microsoft.com/office/powerpoint/2012/main"/>
+    </p:ext>
+  </p:extLst>
 </p:presentation>
 </file>
 
@@ -260,7 +265,7 @@
           <a:p>
             <a:fld id="{DBC4E9ED-2D54-46D5-9889-C2C1FBF05BFC}" type="datetimeFigureOut">
               <a:rPr lang="en-US" smtClean="0"/>
-              <a:t>4/17/2023</a:t>
+              <a:t>4/17/23</a:t>
             </a:fld>
             <a:endParaRPr lang="en-US"/>
           </a:p>
@@ -458,7 +463,7 @@
           <a:p>
             <a:fld id="{DBC4E9ED-2D54-46D5-9889-C2C1FBF05BFC}" type="datetimeFigureOut">
               <a:rPr lang="en-US" smtClean="0"/>
-              <a:t>4/17/2023</a:t>
+              <a:t>4/17/23</a:t>
             </a:fld>
             <a:endParaRPr lang="en-US"/>
           </a:p>
@@ -666,7 +671,7 @@
           <a:p>
             <a:fld id="{DBC4E9ED-2D54-46D5-9889-C2C1FBF05BFC}" type="datetimeFigureOut">
               <a:rPr lang="en-US" smtClean="0"/>
-              <a:t>4/17/2023</a:t>
+              <a:t>4/17/23</a:t>
             </a:fld>
             <a:endParaRPr lang="en-US"/>
           </a:p>
@@ -864,7 +869,7 @@
           <a:p>
             <a:fld id="{DBC4E9ED-2D54-46D5-9889-C2C1FBF05BFC}" type="datetimeFigureOut">
               <a:rPr lang="en-US" smtClean="0"/>
-              <a:t>4/17/2023</a:t>
+              <a:t>4/17/23</a:t>
             </a:fld>
             <a:endParaRPr lang="en-US"/>
           </a:p>
@@ -1139,7 +1144,7 @@
           <a:p>
             <a:fld id="{DBC4E9ED-2D54-46D5-9889-C2C1FBF05BFC}" type="datetimeFigureOut">
               <a:rPr lang="en-US" smtClean="0"/>
-              <a:t>4/17/2023</a:t>
+              <a:t>4/17/23</a:t>
             </a:fld>
             <a:endParaRPr lang="en-US"/>
           </a:p>
@@ -1404,7 +1409,7 @@
           <a:p>
             <a:fld id="{DBC4E9ED-2D54-46D5-9889-C2C1FBF05BFC}" type="datetimeFigureOut">
               <a:rPr lang="en-US" smtClean="0"/>
-              <a:t>4/17/2023</a:t>
+              <a:t>4/17/23</a:t>
             </a:fld>
             <a:endParaRPr lang="en-US"/>
           </a:p>
@@ -1816,7 +1821,7 @@
           <a:p>
             <a:fld id="{DBC4E9ED-2D54-46D5-9889-C2C1FBF05BFC}" type="datetimeFigureOut">
               <a:rPr lang="en-US" smtClean="0"/>
-              <a:t>4/17/2023</a:t>
+              <a:t>4/17/23</a:t>
             </a:fld>
             <a:endParaRPr lang="en-US"/>
           </a:p>
@@ -1957,7 +1962,7 @@
           <a:p>
             <a:fld id="{DBC4E9ED-2D54-46D5-9889-C2C1FBF05BFC}" type="datetimeFigureOut">
               <a:rPr lang="en-US" smtClean="0"/>
-              <a:t>4/17/2023</a:t>
+              <a:t>4/17/23</a:t>
             </a:fld>
             <a:endParaRPr lang="en-US"/>
           </a:p>
@@ -2070,7 +2075,7 @@
           <a:p>
             <a:fld id="{DBC4E9ED-2D54-46D5-9889-C2C1FBF05BFC}" type="datetimeFigureOut">
               <a:rPr lang="en-US" smtClean="0"/>
-              <a:t>4/17/2023</a:t>
+              <a:t>4/17/23</a:t>
             </a:fld>
             <a:endParaRPr lang="en-US"/>
           </a:p>
@@ -2381,7 +2386,7 @@
           <a:p>
             <a:fld id="{DBC4E9ED-2D54-46D5-9889-C2C1FBF05BFC}" type="datetimeFigureOut">
               <a:rPr lang="en-US" smtClean="0"/>
-              <a:t>4/17/2023</a:t>
+              <a:t>4/17/23</a:t>
             </a:fld>
             <a:endParaRPr lang="en-US"/>
           </a:p>
@@ -2669,7 +2674,7 @@
           <a:p>
             <a:fld id="{DBC4E9ED-2D54-46D5-9889-C2C1FBF05BFC}" type="datetimeFigureOut">
               <a:rPr lang="en-US" smtClean="0"/>
-              <a:t>4/17/2023</a:t>
+              <a:t>4/17/23</a:t>
             </a:fld>
             <a:endParaRPr lang="en-US"/>
           </a:p>
@@ -2910,7 +2915,7 @@
           <a:p>
             <a:fld id="{DBC4E9ED-2D54-46D5-9889-C2C1FBF05BFC}" type="datetimeFigureOut">
               <a:rPr lang="en-US" smtClean="0"/>
-              <a:t>4/17/2023</a:t>
+              <a:t>4/17/23</a:t>
             </a:fld>
             <a:endParaRPr lang="en-US"/>
           </a:p>
@@ -4928,7 +4933,15 @@
             </a:pPr>
             <a:r>
               <a:rPr lang="en-US" sz="2200" dirty="0"/>
-              <a:t>Zach Devore, (degree), (front/backend?), *Team Leader</a:t>
+              <a:t>Zach Devore, Computer </a:t>
+            </a:r>
+            <a:r>
+              <a:rPr lang="en-US" sz="2200"/>
+              <a:t>Programming, Team </a:t>
+            </a:r>
+            <a:r>
+              <a:rPr lang="en-US" sz="2200" dirty="0"/>
+              <a:t>Leader</a:t>
             </a:r>
           </a:p>
           <a:p>
@@ -4997,10 +5010,9 @@
               <a:buNone/>
             </a:pPr>
             <a:r>
-              <a:rPr lang="en-US" sz="2200"/>
-              <a:t>Subbu Devarajan</a:t>
-            </a:r>
-            <a:endParaRPr lang="en-US" sz="2200" dirty="0"/>
+              <a:rPr lang="en-US" sz="2200" dirty="0"/>
+              <a:t>Subbu Devarajan, Product Manager at Credit Suisse</a:t>
+            </a:r>
           </a:p>
         </p:txBody>
       </p:sp>

</xml_diff>